<commit_message>
update get the list of times
</commit_message>
<xml_diff>
--- a/DNS Finger Printing.pptx
+++ b/DNS Finger Printing.pptx
@@ -120,6 +120,11 @@
       </a:defRPr>
     </a:lvl9pPr>
   </p:defaultTextStyle>
+  <p:extLst>
+    <p:ext uri="{EFAFB233-063F-42B5-8137-9DF3F51BA10A}">
+      <p15:sldGuideLst xmlns:p15="http://schemas.microsoft.com/office/powerpoint/2012/main"/>
+    </p:ext>
+  </p:extLst>
 </p:presentation>
 </file>
 
@@ -270,7 +275,7 @@
           <a:p>
             <a:fld id="{B43D0B0F-FBE8-4583-B422-784021D88E34}" type="datetimeFigureOut">
               <a:rPr lang="he-IL" smtClean="0"/>
-              <a:t>י'/אלול/תשפ"ב</a:t>
+              <a:t>י"א/אלול/תשפ"ב</a:t>
             </a:fld>
             <a:endParaRPr lang="he-IL"/>
           </a:p>
@@ -468,7 +473,7 @@
           <a:p>
             <a:fld id="{B43D0B0F-FBE8-4583-B422-784021D88E34}" type="datetimeFigureOut">
               <a:rPr lang="he-IL" smtClean="0"/>
-              <a:t>י'/אלול/תשפ"ב</a:t>
+              <a:t>י"א/אלול/תשפ"ב</a:t>
             </a:fld>
             <a:endParaRPr lang="he-IL"/>
           </a:p>
@@ -676,7 +681,7 @@
           <a:p>
             <a:fld id="{B43D0B0F-FBE8-4583-B422-784021D88E34}" type="datetimeFigureOut">
               <a:rPr lang="he-IL" smtClean="0"/>
-              <a:t>י'/אלול/תשפ"ב</a:t>
+              <a:t>י"א/אלול/תשפ"ב</a:t>
             </a:fld>
             <a:endParaRPr lang="he-IL"/>
           </a:p>
@@ -874,7 +879,7 @@
           <a:p>
             <a:fld id="{B43D0B0F-FBE8-4583-B422-784021D88E34}" type="datetimeFigureOut">
               <a:rPr lang="he-IL" smtClean="0"/>
-              <a:t>י'/אלול/תשפ"ב</a:t>
+              <a:t>י"א/אלול/תשפ"ב</a:t>
             </a:fld>
             <a:endParaRPr lang="he-IL"/>
           </a:p>
@@ -1149,7 +1154,7 @@
           <a:p>
             <a:fld id="{B43D0B0F-FBE8-4583-B422-784021D88E34}" type="datetimeFigureOut">
               <a:rPr lang="he-IL" smtClean="0"/>
-              <a:t>י'/אלול/תשפ"ב</a:t>
+              <a:t>י"א/אלול/תשפ"ב</a:t>
             </a:fld>
             <a:endParaRPr lang="he-IL"/>
           </a:p>
@@ -1414,7 +1419,7 @@
           <a:p>
             <a:fld id="{B43D0B0F-FBE8-4583-B422-784021D88E34}" type="datetimeFigureOut">
               <a:rPr lang="he-IL" smtClean="0"/>
-              <a:t>י'/אלול/תשפ"ב</a:t>
+              <a:t>י"א/אלול/תשפ"ב</a:t>
             </a:fld>
             <a:endParaRPr lang="he-IL"/>
           </a:p>
@@ -1826,7 +1831,7 @@
           <a:p>
             <a:fld id="{B43D0B0F-FBE8-4583-B422-784021D88E34}" type="datetimeFigureOut">
               <a:rPr lang="he-IL" smtClean="0"/>
-              <a:t>י'/אלול/תשפ"ב</a:t>
+              <a:t>י"א/אלול/תשפ"ב</a:t>
             </a:fld>
             <a:endParaRPr lang="he-IL"/>
           </a:p>
@@ -1967,7 +1972,7 @@
           <a:p>
             <a:fld id="{B43D0B0F-FBE8-4583-B422-784021D88E34}" type="datetimeFigureOut">
               <a:rPr lang="he-IL" smtClean="0"/>
-              <a:t>י'/אלול/תשפ"ב</a:t>
+              <a:t>י"א/אלול/תשפ"ב</a:t>
             </a:fld>
             <a:endParaRPr lang="he-IL"/>
           </a:p>
@@ -2080,7 +2085,7 @@
           <a:p>
             <a:fld id="{B43D0B0F-FBE8-4583-B422-784021D88E34}" type="datetimeFigureOut">
               <a:rPr lang="he-IL" smtClean="0"/>
-              <a:t>י'/אלול/תשפ"ב</a:t>
+              <a:t>י"א/אלול/תשפ"ב</a:t>
             </a:fld>
             <a:endParaRPr lang="he-IL"/>
           </a:p>
@@ -2391,7 +2396,7 @@
           <a:p>
             <a:fld id="{B43D0B0F-FBE8-4583-B422-784021D88E34}" type="datetimeFigureOut">
               <a:rPr lang="he-IL" smtClean="0"/>
-              <a:t>י'/אלול/תשפ"ב</a:t>
+              <a:t>י"א/אלול/תשפ"ב</a:t>
             </a:fld>
             <a:endParaRPr lang="he-IL"/>
           </a:p>
@@ -2679,7 +2684,7 @@
           <a:p>
             <a:fld id="{B43D0B0F-FBE8-4583-B422-784021D88E34}" type="datetimeFigureOut">
               <a:rPr lang="he-IL" smtClean="0"/>
-              <a:t>י'/אלול/תשפ"ב</a:t>
+              <a:t>י"א/אלול/תשפ"ב</a:t>
             </a:fld>
             <a:endParaRPr lang="he-IL"/>
           </a:p>
@@ -2920,7 +2925,7 @@
           <a:p>
             <a:fld id="{B43D0B0F-FBE8-4583-B422-784021D88E34}" type="datetimeFigureOut">
               <a:rPr lang="he-IL" smtClean="0"/>
-              <a:t>י'/אלול/תשפ"ב</a:t>
+              <a:t>י"א/אלול/תשפ"ב</a:t>
             </a:fld>
             <a:endParaRPr lang="he-IL"/>
           </a:p>

</xml_diff>

<commit_message>
ufter midifing we found some interesting dicoveries
</commit_message>
<xml_diff>
--- a/DNS Finger Printing.pptx
+++ b/DNS Finger Printing.pptx
@@ -5790,7 +5790,7 @@
                 <a:latin typeface="Arial" panose="020B0604020202020204" pitchFamily="34" charset="0"/>
                 <a:ea typeface="Arial" panose="020B0604020202020204" pitchFamily="34" charset="0"/>
               </a:rPr>
-              <a:t> לשמות דומיין באופן זמני, למשך זמן שהוגדר מראש (לרוב על ידי בעל הדומיין – מוגדר מראש בעת הפעלת השרת). לאחר הזמן הזה הכתובת בעבור שם הדומיין </a:t>
+              <a:t> לשמות דומיין באופן זמני, למשך זמן שהוגדר מראש (לרוב על ידי בעל הדומיין – מוגדר מראש בעת הפעלת השרת). </a:t>
             </a:r>
           </a:p>
           <a:p>
@@ -5954,7 +5954,23 @@
                 <a:latin typeface="Arial" panose="020B0604020202020204" pitchFamily="34" charset="0"/>
                 <a:ea typeface="Arial" panose="020B0604020202020204" pitchFamily="34" charset="0"/>
               </a:rPr>
-              <a:t>).</a:t>
+              <a:t>), כלומר בתום הזמן הזה, הרשומה תמחק מן </a:t>
+            </a:r>
+            <a:r>
+              <a:rPr lang="he-IL" sz="1800" dirty="0" err="1">
+                <a:effectLst/>
+                <a:latin typeface="Arial" panose="020B0604020202020204" pitchFamily="34" charset="0"/>
+                <a:ea typeface="Arial" panose="020B0604020202020204" pitchFamily="34" charset="0"/>
+              </a:rPr>
+              <a:t>זכרון</a:t>
+            </a:r>
+            <a:r>
+              <a:rPr lang="he-IL" sz="1800" dirty="0">
+                <a:effectLst/>
+                <a:latin typeface="Arial" panose="020B0604020202020204" pitchFamily="34" charset="0"/>
+                <a:ea typeface="Arial" panose="020B0604020202020204" pitchFamily="34" charset="0"/>
+              </a:rPr>
+              <a:t> המטמון.</a:t>
             </a:r>
           </a:p>
           <a:p>

</xml_diff>